<commit_message>
Report Update and Modification
</commit_message>
<xml_diff>
--- a/Phase_I/Dissertation_Phase1.pptx
+++ b/Phase_I/Dissertation_Phase1.pptx
@@ -271,7 +271,7 @@
           <a:p>
             <a:fld id="{2C38DC1F-B3A0-4880-B390-B7047C16692A}" type="datetimeFigureOut">
               <a:rPr lang="en-US" smtClean="0"/>
-              <a:t>11/7/2021</a:t>
+              <a:t>12/1/2021</a:t>
             </a:fld>
             <a:endParaRPr lang="en-US"/>
           </a:p>
@@ -441,7 +441,7 @@
           <a:p>
             <a:fld id="{2C38DC1F-B3A0-4880-B390-B7047C16692A}" type="datetimeFigureOut">
               <a:rPr lang="en-US" smtClean="0"/>
-              <a:t>11/7/2021</a:t>
+              <a:t>12/1/2021</a:t>
             </a:fld>
             <a:endParaRPr lang="en-US"/>
           </a:p>
@@ -621,7 +621,7 @@
           <a:p>
             <a:fld id="{2C38DC1F-B3A0-4880-B390-B7047C16692A}" type="datetimeFigureOut">
               <a:rPr lang="en-US" smtClean="0"/>
-              <a:t>11/7/2021</a:t>
+              <a:t>12/1/2021</a:t>
             </a:fld>
             <a:endParaRPr lang="en-US"/>
           </a:p>
@@ -791,7 +791,7 @@
           <a:p>
             <a:fld id="{2C38DC1F-B3A0-4880-B390-B7047C16692A}" type="datetimeFigureOut">
               <a:rPr lang="en-US" smtClean="0"/>
-              <a:t>11/7/2021</a:t>
+              <a:t>12/1/2021</a:t>
             </a:fld>
             <a:endParaRPr lang="en-US"/>
           </a:p>
@@ -1037,7 +1037,7 @@
           <a:p>
             <a:fld id="{2C38DC1F-B3A0-4880-B390-B7047C16692A}" type="datetimeFigureOut">
               <a:rPr lang="en-US" smtClean="0"/>
-              <a:t>11/7/2021</a:t>
+              <a:t>12/1/2021</a:t>
             </a:fld>
             <a:endParaRPr lang="en-US"/>
           </a:p>
@@ -1269,7 +1269,7 @@
           <a:p>
             <a:fld id="{2C38DC1F-B3A0-4880-B390-B7047C16692A}" type="datetimeFigureOut">
               <a:rPr lang="en-US" smtClean="0"/>
-              <a:t>11/7/2021</a:t>
+              <a:t>12/1/2021</a:t>
             </a:fld>
             <a:endParaRPr lang="en-US"/>
           </a:p>
@@ -1636,7 +1636,7 @@
           <a:p>
             <a:fld id="{2C38DC1F-B3A0-4880-B390-B7047C16692A}" type="datetimeFigureOut">
               <a:rPr lang="en-US" smtClean="0"/>
-              <a:t>11/7/2021</a:t>
+              <a:t>12/1/2021</a:t>
             </a:fld>
             <a:endParaRPr lang="en-US"/>
           </a:p>
@@ -1754,7 +1754,7 @@
           <a:p>
             <a:fld id="{2C38DC1F-B3A0-4880-B390-B7047C16692A}" type="datetimeFigureOut">
               <a:rPr lang="en-US" smtClean="0"/>
-              <a:t>11/7/2021</a:t>
+              <a:t>12/1/2021</a:t>
             </a:fld>
             <a:endParaRPr lang="en-US"/>
           </a:p>
@@ -1849,7 +1849,7 @@
           <a:p>
             <a:fld id="{2C38DC1F-B3A0-4880-B390-B7047C16692A}" type="datetimeFigureOut">
               <a:rPr lang="en-US" smtClean="0"/>
-              <a:t>11/7/2021</a:t>
+              <a:t>12/1/2021</a:t>
             </a:fld>
             <a:endParaRPr lang="en-US"/>
           </a:p>
@@ -2126,7 +2126,7 @@
           <a:p>
             <a:fld id="{2C38DC1F-B3A0-4880-B390-B7047C16692A}" type="datetimeFigureOut">
               <a:rPr lang="en-US" smtClean="0"/>
-              <a:t>11/7/2021</a:t>
+              <a:t>12/1/2021</a:t>
             </a:fld>
             <a:endParaRPr lang="en-US"/>
           </a:p>
@@ -2379,7 +2379,7 @@
           <a:p>
             <a:fld id="{2C38DC1F-B3A0-4880-B390-B7047C16692A}" type="datetimeFigureOut">
               <a:rPr lang="en-US" smtClean="0"/>
-              <a:t>11/7/2021</a:t>
+              <a:t>12/1/2021</a:t>
             </a:fld>
             <a:endParaRPr lang="en-US"/>
           </a:p>
@@ -2592,7 +2592,7 @@
           <a:p>
             <a:fld id="{2C38DC1F-B3A0-4880-B390-B7047C16692A}" type="datetimeFigureOut">
               <a:rPr lang="en-US" smtClean="0"/>
-              <a:t>11/7/2021</a:t>
+              <a:t>12/1/2021</a:t>
             </a:fld>
             <a:endParaRPr lang="en-US"/>
           </a:p>
@@ -3014,18 +3014,60 @@
           </a:xfrm>
         </p:spPr>
         <p:txBody>
-          <a:bodyPr/>
+          <a:bodyPr>
+            <a:noAutofit/>
+          </a:bodyPr>
           <a:lstStyle/>
           <a:p>
             <a:pPr algn="ctr"/>
             <a:r>
-              <a:rPr lang="en-US" dirty="0" smtClean="0">
-                <a:latin typeface="Times New Roman" panose="02020603050405020304" pitchFamily="18" charset="0"/>
-                <a:cs typeface="Times New Roman" panose="02020603050405020304" pitchFamily="18" charset="0"/>
-              </a:rPr>
-              <a:t>Pattern Recognition and Machine Learning</a:t>
-            </a:r>
-            <a:endParaRPr lang="en-US" dirty="0">
+              <a:rPr lang="en-US" sz="3600" dirty="0" smtClean="0">
+                <a:latin typeface="Times New Roman" panose="02020603050405020304" pitchFamily="18" charset="0"/>
+                <a:cs typeface="Times New Roman" panose="02020603050405020304" pitchFamily="18" charset="0"/>
+              </a:rPr>
+              <a:t>Pattern Recognition and Machine </a:t>
+            </a:r>
+            <a:r>
+              <a:rPr lang="en-US" sz="3600" dirty="0" smtClean="0">
+                <a:latin typeface="Times New Roman" panose="02020603050405020304" pitchFamily="18" charset="0"/>
+                <a:cs typeface="Times New Roman" panose="02020603050405020304" pitchFamily="18" charset="0"/>
+              </a:rPr>
+              <a:t>Learning</a:t>
+            </a:r>
+            <a:br>
+              <a:rPr lang="en-US" sz="3600" dirty="0" smtClean="0">
+                <a:latin typeface="Times New Roman" panose="02020603050405020304" pitchFamily="18" charset="0"/>
+                <a:cs typeface="Times New Roman" panose="02020603050405020304" pitchFamily="18" charset="0"/>
+              </a:rPr>
+            </a:br>
+            <a:r>
+              <a:rPr lang="en-US" sz="3600" dirty="0">
+                <a:latin typeface="Times New Roman" panose="02020603050405020304" pitchFamily="18" charset="0"/>
+                <a:cs typeface="Times New Roman" panose="02020603050405020304" pitchFamily="18" charset="0"/>
+              </a:rPr>
+              <a:t/>
+            </a:r>
+            <a:br>
+              <a:rPr lang="en-US" sz="3600" dirty="0">
+                <a:latin typeface="Times New Roman" panose="02020603050405020304" pitchFamily="18" charset="0"/>
+                <a:cs typeface="Times New Roman" panose="02020603050405020304" pitchFamily="18" charset="0"/>
+              </a:rPr>
+            </a:br>
+            <a:r>
+              <a:rPr lang="en-US" sz="3600" dirty="0" smtClean="0">
+                <a:latin typeface="Times New Roman" panose="02020603050405020304" pitchFamily="18" charset="0"/>
+                <a:cs typeface="Times New Roman" panose="02020603050405020304" pitchFamily="18" charset="0"/>
+              </a:rPr>
+              <a:t>Proposed Topic :</a:t>
+            </a:r>
+            <a:r>
+              <a:rPr lang="en-US" sz="3600" dirty="0">
+                <a:latin typeface="Times New Roman" panose="02020603050405020304" pitchFamily="18" charset="0"/>
+                <a:cs typeface="Times New Roman" panose="02020603050405020304" pitchFamily="18" charset="0"/>
+              </a:rPr>
+              <a:t>Bounding Box Refinement Agent for Overlapping Object Detection</a:t>
+            </a:r>
+            <a:endParaRPr lang="en-US" sz="3600" dirty="0">
               <a:latin typeface="Times New Roman" panose="02020603050405020304" pitchFamily="18" charset="0"/>
               <a:cs typeface="Times New Roman" panose="02020603050405020304" pitchFamily="18" charset="0"/>
             </a:endParaRPr>
@@ -9094,8 +9136,8 @@
           </a:p>
         </p:txBody>
       </p:sp>
-      <mc:AlternateContent xmlns:mc="http://schemas.openxmlformats.org/markup-compatibility/2006">
-        <mc:Choice xmlns:a14="http://schemas.microsoft.com/office/drawing/2010/main" Requires="a14">
+      <mc:AlternateContent xmlns:mc="http://schemas.openxmlformats.org/markup-compatibility/2006" xmlns:a14="http://schemas.microsoft.com/office/drawing/2010/main">
+        <mc:Choice Requires="a14">
           <p:sp>
             <p:nvSpPr>
               <p:cNvPr id="3" name="Content Placeholder 2"/>
@@ -9365,14 +9407,7 @@
                     <a:latin typeface="Times New Roman" panose="02020603050405020304" pitchFamily="18" charset="0"/>
                     <a:cs typeface="Times New Roman" panose="02020603050405020304" pitchFamily="18" charset="0"/>
                   </a:rPr>
-                  <a:t> </a:t>
-                </a:r>
-                <a:r>
-                  <a:rPr lang="en-US" sz="1800" dirty="0" smtClean="0">
-                    <a:latin typeface="Times New Roman" panose="02020603050405020304" pitchFamily="18" charset="0"/>
-                    <a:cs typeface="Times New Roman" panose="02020603050405020304" pitchFamily="18" charset="0"/>
-                  </a:rPr>
-                  <a:t>is </a:t>
+                  <a:t> is </a:t>
                 </a:r>
                 <a:r>
                   <a:rPr lang="en-US" sz="1800" dirty="0">
@@ -9400,14 +9435,7 @@
                     <a:latin typeface="Times New Roman" panose="02020603050405020304" pitchFamily="18" charset="0"/>
                     <a:cs typeface="Times New Roman" panose="02020603050405020304" pitchFamily="18" charset="0"/>
                   </a:rPr>
-                  <a:t> </a:t>
-                </a:r>
-                <a:r>
-                  <a:rPr lang="en-US" sz="1800" i="1" dirty="0" smtClean="0">
-                    <a:latin typeface="Times New Roman" panose="02020603050405020304" pitchFamily="18" charset="0"/>
-                    <a:cs typeface="Times New Roman" panose="02020603050405020304" pitchFamily="18" charset="0"/>
-                  </a:rPr>
-                  <a:t>R</a:t>
+                  <a:t> R</a:t>
                 </a:r>
                 <a:r>
                   <a:rPr lang="en-US" sz="1800" i="1" baseline="30000" dirty="0" smtClean="0">
@@ -9670,7 +9698,7 @@
             </p:txBody>
           </p:sp>
         </mc:Choice>
-        <mc:Fallback>
+        <mc:Fallback xmlns="">
           <p:sp>
             <p:nvSpPr>
               <p:cNvPr id="3" name="Content Placeholder 2"/>
@@ -10607,8 +10635,8 @@
           </a:p>
         </p:txBody>
       </p:sp>
-      <mc:AlternateContent xmlns:mc="http://schemas.openxmlformats.org/markup-compatibility/2006">
-        <mc:Choice xmlns:a14="http://schemas.microsoft.com/office/drawing/2010/main" Requires="a14">
+      <mc:AlternateContent xmlns:mc="http://schemas.openxmlformats.org/markup-compatibility/2006" xmlns:a14="http://schemas.microsoft.com/office/drawing/2010/main">
+        <mc:Choice Requires="a14">
           <p:sp>
             <p:nvSpPr>
               <p:cNvPr id="3" name="Content Placeholder 2"/>
@@ -10912,10 +10940,6 @@
                   </a:rPr>
                   <a:t>trajectory distribution</a:t>
                 </a:r>
-                <a:endParaRPr lang="en-US" dirty="0">
-                  <a:latin typeface="Times New Roman" panose="02020603050405020304" pitchFamily="18" charset="0"/>
-                  <a:cs typeface="Times New Roman" panose="02020603050405020304" pitchFamily="18" charset="0"/>
-                </a:endParaRPr>
               </a:p>
               <a:p>
                 <a:endParaRPr lang="en-US" sz="2000" dirty="0" smtClean="0">
@@ -10953,7 +10977,7 @@
             </p:txBody>
           </p:sp>
         </mc:Choice>
-        <mc:Fallback>
+        <mc:Fallback xmlns="">
           <p:sp>
             <p:nvSpPr>
               <p:cNvPr id="3" name="Content Placeholder 2"/>
@@ -11393,10 +11417,6 @@
               </a:rPr>
               <a:t>the Q values of the action.</a:t>
             </a:r>
-            <a:endParaRPr lang="en-US" sz="2000" dirty="0">
-              <a:latin typeface="Times New Roman" panose="02020603050405020304" pitchFamily="18" charset="0"/>
-              <a:cs typeface="Times New Roman" panose="02020603050405020304" pitchFamily="18" charset="0"/>
-            </a:endParaRPr>
           </a:p>
         </p:txBody>
       </p:sp>
@@ -11510,10 +11530,6 @@
               </a:rPr>
               <a:t>An illustration of Actor-Critic algorithm in two cases: </a:t>
             </a:r>
-            <a:endParaRPr lang="en-US" sz="2000" dirty="0">
-              <a:latin typeface="Times New Roman" panose="02020603050405020304" pitchFamily="18" charset="0"/>
-              <a:cs typeface="Times New Roman" panose="02020603050405020304" pitchFamily="18" charset="0"/>
-            </a:endParaRPr>
           </a:p>
           <a:p>
             <a:pPr algn="ctr"/>
@@ -11659,7 +11675,7 @@
             </p:spPr>
             <p:txBody>
               <a:bodyPr>
-                <a:normAutofit fontScale="92500" lnSpcReduction="10000"/>
+                <a:normAutofit lnSpcReduction="10000"/>
               </a:bodyPr>
               <a:lstStyle/>
               <a:p>
@@ -11993,168 +12009,133 @@
                   </a:rPr>
                   <a:t>. </a:t>
                 </a:r>
-                <a:r>
-                  <a:rPr lang="en-US" sz="2000" dirty="0">
-                    <a:latin typeface="Times New Roman" panose="02020603050405020304" pitchFamily="18" charset="0"/>
-                    <a:cs typeface="Times New Roman" panose="02020603050405020304" pitchFamily="18" charset="0"/>
-                  </a:rPr>
-                  <a:t>In the following, we will cover the most common </a:t>
-                </a:r>
-                <a:r>
-                  <a:rPr lang="en-US" sz="2000" dirty="0" smtClean="0">
-                    <a:latin typeface="Times New Roman" panose="02020603050405020304" pitchFamily="18" charset="0"/>
-                    <a:cs typeface="Times New Roman" panose="02020603050405020304" pitchFamily="18" charset="0"/>
-                  </a:rPr>
-                  <a:t>model-based DRL </a:t>
-                </a:r>
-                <a:r>
-                  <a:rPr lang="en-US" sz="2000" dirty="0">
-                    <a:latin typeface="Times New Roman" panose="02020603050405020304" pitchFamily="18" charset="0"/>
-                    <a:cs typeface="Times New Roman" panose="02020603050405020304" pitchFamily="18" charset="0"/>
-                  </a:rPr>
-                  <a:t>approaches including value function and policy search methods</a:t>
-                </a:r>
-                <a:r>
-                  <a:rPr lang="en-US" sz="2000" dirty="0" smtClean="0">
-                    <a:latin typeface="Times New Roman" panose="02020603050405020304" pitchFamily="18" charset="0"/>
-                    <a:cs typeface="Times New Roman" panose="02020603050405020304" pitchFamily="18" charset="0"/>
-                  </a:rPr>
-                  <a:t>.</a:t>
-                </a:r>
-              </a:p>
-              <a:p>
-                <a:r>
-                  <a:rPr lang="en-US" sz="2000" dirty="0">
-                    <a:latin typeface="Times New Roman" panose="02020603050405020304" pitchFamily="18" charset="0"/>
-                    <a:cs typeface="Times New Roman" panose="02020603050405020304" pitchFamily="18" charset="0"/>
-                  </a:rPr>
-                  <a:t>Value </a:t>
-                </a:r>
-                <a:r>
-                  <a:rPr lang="en-US" sz="2000" dirty="0" smtClean="0">
-                    <a:latin typeface="Times New Roman" panose="02020603050405020304" pitchFamily="18" charset="0"/>
-                    <a:cs typeface="Times New Roman" panose="02020603050405020304" pitchFamily="18" charset="0"/>
-                  </a:rPr>
-                  <a:t>function: We </a:t>
-                </a:r>
-                <a:r>
-                  <a:rPr lang="en-US" sz="2000" dirty="0">
-                    <a:latin typeface="Times New Roman" panose="02020603050405020304" pitchFamily="18" charset="0"/>
-                    <a:cs typeface="Times New Roman" panose="02020603050405020304" pitchFamily="18" charset="0"/>
-                  </a:rPr>
-                  <a:t>start this category with </a:t>
-                </a:r>
-                <a:r>
-                  <a:rPr lang="en-US" sz="2000" dirty="0" smtClean="0">
-                    <a:latin typeface="Times New Roman" panose="02020603050405020304" pitchFamily="18" charset="0"/>
-                    <a:cs typeface="Times New Roman" panose="02020603050405020304" pitchFamily="18" charset="0"/>
-                  </a:rPr>
-                  <a:t>DQN </a:t>
-                </a:r>
-                <a:r>
-                  <a:rPr lang="en-US" sz="2000" dirty="0">
-                    <a:latin typeface="Times New Roman" panose="02020603050405020304" pitchFamily="18" charset="0"/>
-                    <a:cs typeface="Times New Roman" panose="02020603050405020304" pitchFamily="18" charset="0"/>
-                  </a:rPr>
-                  <a:t>which has been successfully applied to classic </a:t>
-                </a:r>
-                <a:r>
-                  <a:rPr lang="en-US" sz="2000" dirty="0" smtClean="0">
-                    <a:latin typeface="Times New Roman" panose="02020603050405020304" pitchFamily="18" charset="0"/>
-                    <a:cs typeface="Times New Roman" panose="02020603050405020304" pitchFamily="18" charset="0"/>
-                  </a:rPr>
-                  <a:t>Atari. DQN </a:t>
-                </a:r>
-                <a:r>
-                  <a:rPr lang="en-US" sz="2000" dirty="0">
-                    <a:latin typeface="Times New Roman" panose="02020603050405020304" pitchFamily="18" charset="0"/>
-                    <a:cs typeface="Times New Roman" panose="02020603050405020304" pitchFamily="18" charset="0"/>
-                  </a:rPr>
-                  <a:t>uses CNNs to deal with high dimensional state space </a:t>
-                </a:r>
-                <a:r>
-                  <a:rPr lang="en-US" sz="2000" dirty="0" smtClean="0">
-                    <a:latin typeface="Times New Roman" panose="02020603050405020304" pitchFamily="18" charset="0"/>
-                    <a:cs typeface="Times New Roman" panose="02020603050405020304" pitchFamily="18" charset="0"/>
-                  </a:rPr>
-                  <a:t>like pixels</a:t>
-                </a:r>
-                <a:r>
-                  <a:rPr lang="en-US" sz="2000" dirty="0">
-                    <a:latin typeface="Times New Roman" panose="02020603050405020304" pitchFamily="18" charset="0"/>
-                    <a:cs typeface="Times New Roman" panose="02020603050405020304" pitchFamily="18" charset="0"/>
-                  </a:rPr>
-                  <a:t>, to approximate the Q-value function</a:t>
-                </a:r>
-                <a:r>
-                  <a:rPr lang="en-US" sz="2000" dirty="0" smtClean="0">
-                    <a:latin typeface="Times New Roman" panose="02020603050405020304" pitchFamily="18" charset="0"/>
-                    <a:cs typeface="Times New Roman" panose="02020603050405020304" pitchFamily="18" charset="0"/>
-                  </a:rPr>
-                  <a:t>.</a:t>
-                </a:r>
-              </a:p>
-              <a:p>
-                <a:r>
-                  <a:rPr lang="en-US" sz="2200" dirty="0">
-                    <a:latin typeface="Times New Roman" panose="02020603050405020304" pitchFamily="18" charset="0"/>
-                    <a:cs typeface="Times New Roman" panose="02020603050405020304" pitchFamily="18" charset="0"/>
-                  </a:rPr>
-                  <a:t>Policy </a:t>
-                </a:r>
-                <a:r>
-                  <a:rPr lang="en-US" sz="2200" dirty="0" smtClean="0">
-                    <a:latin typeface="Times New Roman" panose="02020603050405020304" pitchFamily="18" charset="0"/>
-                    <a:cs typeface="Times New Roman" panose="02020603050405020304" pitchFamily="18" charset="0"/>
-                  </a:rPr>
-                  <a:t>search: These methods </a:t>
-                </a:r>
-                <a:r>
-                  <a:rPr lang="en-US" sz="2200" dirty="0">
-                    <a:latin typeface="Times New Roman" panose="02020603050405020304" pitchFamily="18" charset="0"/>
-                    <a:cs typeface="Times New Roman" panose="02020603050405020304" pitchFamily="18" charset="0"/>
-                  </a:rPr>
-                  <a:t>aim to </a:t>
-                </a:r>
-                <a:r>
-                  <a:rPr lang="en-US" sz="2200">
-                    <a:latin typeface="Times New Roman" panose="02020603050405020304" pitchFamily="18" charset="0"/>
-                    <a:cs typeface="Times New Roman" panose="02020603050405020304" pitchFamily="18" charset="0"/>
-                  </a:rPr>
-                  <a:t>directly </a:t>
-                </a:r>
-                <a:r>
-                  <a:rPr lang="en-US" sz="2200" smtClean="0">
-                    <a:latin typeface="Times New Roman" panose="02020603050405020304" pitchFamily="18" charset="0"/>
-                    <a:cs typeface="Times New Roman" panose="02020603050405020304" pitchFamily="18" charset="0"/>
-                  </a:rPr>
-                  <a:t>find </a:t>
-                </a:r>
-                <a:r>
-                  <a:rPr lang="en-US" sz="2200" dirty="0">
-                    <a:latin typeface="Times New Roman" panose="02020603050405020304" pitchFamily="18" charset="0"/>
-                    <a:cs typeface="Times New Roman" panose="02020603050405020304" pitchFamily="18" charset="0"/>
-                  </a:rPr>
-                  <a:t>policies by means of gradient-free or </a:t>
-                </a:r>
-                <a:r>
-                  <a:rPr lang="en-US" sz="2200" dirty="0" smtClean="0">
-                    <a:latin typeface="Times New Roman" panose="02020603050405020304" pitchFamily="18" charset="0"/>
-                    <a:cs typeface="Times New Roman" panose="02020603050405020304" pitchFamily="18" charset="0"/>
-                  </a:rPr>
-                  <a:t>gradient based methods</a:t>
-                </a:r>
-                <a:r>
-                  <a:rPr lang="en-US" sz="2200" dirty="0">
-                    <a:latin typeface="Times New Roman" panose="02020603050405020304" pitchFamily="18" charset="0"/>
-                    <a:cs typeface="Times New Roman" panose="02020603050405020304" pitchFamily="18" charset="0"/>
-                  </a:rPr>
-                  <a:t>.</a:t>
-                </a:r>
-                <a:endParaRPr lang="en-US" sz="2200" dirty="0">
+                <a:endParaRPr lang="en-US" sz="2000" dirty="0" smtClean="0">
                   <a:latin typeface="Times New Roman" panose="02020603050405020304" pitchFamily="18" charset="0"/>
                   <a:cs typeface="Times New Roman" panose="02020603050405020304" pitchFamily="18" charset="0"/>
                 </a:endParaRPr>
+              </a:p>
+              <a:p>
+                <a:r>
+                  <a:rPr lang="en-US" sz="2000" dirty="0" smtClean="0">
+                    <a:latin typeface="Times New Roman" panose="02020603050405020304" pitchFamily="18" charset="0"/>
+                    <a:cs typeface="Times New Roman" panose="02020603050405020304" pitchFamily="18" charset="0"/>
+                  </a:rPr>
+                  <a:t>Value </a:t>
+                </a:r>
+                <a:r>
+                  <a:rPr lang="en-US" sz="2000" dirty="0" smtClean="0">
+                    <a:latin typeface="Times New Roman" panose="02020603050405020304" pitchFamily="18" charset="0"/>
+                    <a:cs typeface="Times New Roman" panose="02020603050405020304" pitchFamily="18" charset="0"/>
+                  </a:rPr>
+                  <a:t>function: We </a:t>
+                </a:r>
+                <a:r>
+                  <a:rPr lang="en-US" sz="2000" dirty="0">
+                    <a:latin typeface="Times New Roman" panose="02020603050405020304" pitchFamily="18" charset="0"/>
+                    <a:cs typeface="Times New Roman" panose="02020603050405020304" pitchFamily="18" charset="0"/>
+                  </a:rPr>
+                  <a:t>start this category with </a:t>
+                </a:r>
+                <a:r>
+                  <a:rPr lang="en-US" sz="2000" dirty="0" smtClean="0">
+                    <a:latin typeface="Times New Roman" panose="02020603050405020304" pitchFamily="18" charset="0"/>
+                    <a:cs typeface="Times New Roman" panose="02020603050405020304" pitchFamily="18" charset="0"/>
+                  </a:rPr>
+                  <a:t>DQN </a:t>
+                </a:r>
+                <a:r>
+                  <a:rPr lang="en-US" sz="2000" dirty="0">
+                    <a:latin typeface="Times New Roman" panose="02020603050405020304" pitchFamily="18" charset="0"/>
+                    <a:cs typeface="Times New Roman" panose="02020603050405020304" pitchFamily="18" charset="0"/>
+                  </a:rPr>
+                  <a:t>which has been successfully applied to classic </a:t>
+                </a:r>
+                <a:r>
+                  <a:rPr lang="en-US" sz="2000" dirty="0" smtClean="0">
+                    <a:latin typeface="Times New Roman" panose="02020603050405020304" pitchFamily="18" charset="0"/>
+                    <a:cs typeface="Times New Roman" panose="02020603050405020304" pitchFamily="18" charset="0"/>
+                  </a:rPr>
+                  <a:t>Atari. DQN </a:t>
+                </a:r>
+                <a:r>
+                  <a:rPr lang="en-US" sz="2000" dirty="0">
+                    <a:latin typeface="Times New Roman" panose="02020603050405020304" pitchFamily="18" charset="0"/>
+                    <a:cs typeface="Times New Roman" panose="02020603050405020304" pitchFamily="18" charset="0"/>
+                  </a:rPr>
+                  <a:t>uses CNNs to deal with high dimensional state space </a:t>
+                </a:r>
+                <a:r>
+                  <a:rPr lang="en-US" sz="2000" dirty="0" smtClean="0">
+                    <a:latin typeface="Times New Roman" panose="02020603050405020304" pitchFamily="18" charset="0"/>
+                    <a:cs typeface="Times New Roman" panose="02020603050405020304" pitchFamily="18" charset="0"/>
+                  </a:rPr>
+                  <a:t>like pixels</a:t>
+                </a:r>
+                <a:r>
+                  <a:rPr lang="en-US" sz="2000" dirty="0">
+                    <a:latin typeface="Times New Roman" panose="02020603050405020304" pitchFamily="18" charset="0"/>
+                    <a:cs typeface="Times New Roman" panose="02020603050405020304" pitchFamily="18" charset="0"/>
+                  </a:rPr>
+                  <a:t>, to approximate the Q-value function</a:t>
+                </a:r>
+                <a:r>
+                  <a:rPr lang="en-US" sz="2000" dirty="0" smtClean="0">
+                    <a:latin typeface="Times New Roman" panose="02020603050405020304" pitchFamily="18" charset="0"/>
+                    <a:cs typeface="Times New Roman" panose="02020603050405020304" pitchFamily="18" charset="0"/>
+                  </a:rPr>
+                  <a:t>.</a:t>
+                </a:r>
+              </a:p>
+              <a:p>
+                <a:r>
+                  <a:rPr lang="en-US" sz="2200" dirty="0">
+                    <a:latin typeface="Times New Roman" panose="02020603050405020304" pitchFamily="18" charset="0"/>
+                    <a:cs typeface="Times New Roman" panose="02020603050405020304" pitchFamily="18" charset="0"/>
+                  </a:rPr>
+                  <a:t>Policy </a:t>
+                </a:r>
+                <a:r>
+                  <a:rPr lang="en-US" sz="2200" dirty="0" smtClean="0">
+                    <a:latin typeface="Times New Roman" panose="02020603050405020304" pitchFamily="18" charset="0"/>
+                    <a:cs typeface="Times New Roman" panose="02020603050405020304" pitchFamily="18" charset="0"/>
+                  </a:rPr>
+                  <a:t>search: These methods </a:t>
+                </a:r>
+                <a:r>
+                  <a:rPr lang="en-US" sz="2200" dirty="0">
+                    <a:latin typeface="Times New Roman" panose="02020603050405020304" pitchFamily="18" charset="0"/>
+                    <a:cs typeface="Times New Roman" panose="02020603050405020304" pitchFamily="18" charset="0"/>
+                  </a:rPr>
+                  <a:t>aim to directly </a:t>
+                </a:r>
+                <a:r>
+                  <a:rPr lang="en-US" sz="2200" dirty="0" smtClean="0">
+                    <a:latin typeface="Times New Roman" panose="02020603050405020304" pitchFamily="18" charset="0"/>
+                    <a:cs typeface="Times New Roman" panose="02020603050405020304" pitchFamily="18" charset="0"/>
+                  </a:rPr>
+                  <a:t>find </a:t>
+                </a:r>
+                <a:r>
+                  <a:rPr lang="en-US" sz="2200" dirty="0">
+                    <a:latin typeface="Times New Roman" panose="02020603050405020304" pitchFamily="18" charset="0"/>
+                    <a:cs typeface="Times New Roman" panose="02020603050405020304" pitchFamily="18" charset="0"/>
+                  </a:rPr>
+                  <a:t>policies by means of gradient-free or </a:t>
+                </a:r>
+                <a:r>
+                  <a:rPr lang="en-US" sz="2200" dirty="0" smtClean="0">
+                    <a:latin typeface="Times New Roman" panose="02020603050405020304" pitchFamily="18" charset="0"/>
+                    <a:cs typeface="Times New Roman" panose="02020603050405020304" pitchFamily="18" charset="0"/>
+                  </a:rPr>
+                  <a:t>gradient based methods</a:t>
+                </a:r>
+                <a:r>
+                  <a:rPr lang="en-US" sz="2200" dirty="0">
+                    <a:latin typeface="Times New Roman" panose="02020603050405020304" pitchFamily="18" charset="0"/>
+                    <a:cs typeface="Times New Roman" panose="02020603050405020304" pitchFamily="18" charset="0"/>
+                  </a:rPr>
+                  <a:t>.</a:t>
+                </a:r>
               </a:p>
             </p:txBody>
           </p:sp>
@@ -12178,7 +12159,7 @@
               <a:blipFill>
                 <a:blip r:embed="rId2"/>
                 <a:stretch>
-                  <a:fillRect l="-522" t="-1609" r="-174"/>
+                  <a:fillRect l="-696" t="-1839" r="-580"/>
                 </a:stretch>
               </a:blipFill>
             </p:spPr>
@@ -12240,18 +12221,10 @@
         <p:spPr/>
         <p:txBody>
           <a:bodyPr>
-            <a:normAutofit fontScale="90000"/>
+            <a:normAutofit/>
           </a:bodyPr>
           <a:lstStyle/>
           <a:p>
-            <a:r>
-              <a:rPr lang="en-US" dirty="0" err="1" smtClean="0"/>
-              <a:t>ConTra</a:t>
-            </a:r>
-            <a:r>
-              <a:rPr lang="en-US" dirty="0" smtClean="0"/>
-              <a:t>: Continuous Translation Action Agent for Bounding Box Refinement</a:t>
-            </a:r>
             <a:endParaRPr lang="en-US" dirty="0"/>
           </a:p>
         </p:txBody>

</xml_diff>